<commit_message>
Explicit query screenshots added.
</commit_message>
<xml_diff>
--- a/incquery-deps-tdk/visio-diagrams/diagram-source.pptx
+++ b/incquery-deps-tdk/visio-diagrams/diagram-source.pptx
@@ -2511,7 +2511,7 @@
   <dgm:whole/>
   <dgm:extLst>
     <a:ext uri="http://schemas.microsoft.com/office/drawing/2008/diagram">
-      <dsp:dataModelExt xmlns:dsp="http://schemas.microsoft.com/office/drawing/2008/diagram" relId="rId7" minVer="http://schemas.openxmlformats.org/drawingml/2006/diagram"/>
+      <dsp:dataModelExt xmlns:dsp="http://schemas.microsoft.com/office/drawing/2008/diagram" relId="rId8" minVer="http://schemas.openxmlformats.org/drawingml/2006/diagram"/>
     </a:ext>
   </dgm:extLst>
 </dgm:dataModel>
@@ -14337,36 +14337,39 @@
       </p:grpSpPr>
       <p:sp>
         <p:nvSpPr>
-          <p:cNvPr id="19" name="Line Callout 1 (Border and Accent Bar) 18"/>
+          <p:cNvPr id="52" name="Rectangle 51"/>
           <p:cNvSpPr/>
           <p:nvPr/>
         </p:nvSpPr>
         <p:spPr>
-          <a:xfrm rot="5400000">
-            <a:off x="2647461" y="3172732"/>
-            <a:ext cx="917852" cy="1310038"/>
-          </a:xfrm>
-          <a:prstGeom prst="accentBorderCallout1">
-            <a:avLst>
-              <a:gd name="adj1" fmla="val 48560"/>
-              <a:gd name="adj2" fmla="val -8333"/>
-              <a:gd name="adj3" fmla="val 62432"/>
-              <a:gd name="adj4" fmla="val -18825"/>
-            </a:avLst>
+          <a:xfrm>
+            <a:off x="2271714" y="5337424"/>
+            <a:ext cx="920223" cy="171584"/>
+          </a:xfrm>
+          <a:prstGeom prst="rect">
+            <a:avLst/>
           </a:prstGeom>
+          <a:noFill/>
+          <a:ln>
+            <a:solidFill>
+              <a:schemeClr val="bg1"/>
+            </a:solidFill>
+          </a:ln>
         </p:spPr>
         <p:style>
           <a:lnRef idx="2">
-            <a:schemeClr val="accent1"/>
+            <a:schemeClr val="accent1">
+              <a:shade val="50000"/>
+            </a:schemeClr>
           </a:lnRef>
           <a:fillRef idx="1">
-            <a:schemeClr val="lt1"/>
+            <a:schemeClr val="accent1"/>
           </a:fillRef>
           <a:effectRef idx="0">
             <a:schemeClr val="accent1"/>
           </a:effectRef>
           <a:fontRef idx="minor">
-            <a:schemeClr val="dk1"/>
+            <a:schemeClr val="lt1"/>
           </a:fontRef>
         </p:style>
         <p:txBody>
@@ -14374,19 +14377,19 @@
           <a:lstStyle/>
           <a:p>
             <a:pPr algn="ctr"/>
-            <a:endParaRPr lang="en-US" dirty="0"/>
+            <a:endParaRPr lang="en-US"/>
           </a:p>
         </p:txBody>
       </p:sp>
       <p:pic>
         <p:nvPicPr>
-          <p:cNvPr id="1028" name="Picture 4"/>
+          <p:cNvPr id="27" name="Picture 3"/>
           <p:cNvPicPr>
             <a:picLocks noChangeAspect="1" noChangeArrowheads="1"/>
           </p:cNvPicPr>
           <p:nvPr/>
         </p:nvPicPr>
-        <p:blipFill rotWithShape="1">
+        <p:blipFill>
           <a:blip r:embed="rId2">
             <a:extLst>
               <a:ext uri="{28A0092B-C50C-407E-A947-70E740481C1C}">
@@ -14394,13 +14397,15 @@
               </a:ext>
             </a:extLst>
           </a:blip>
-          <a:srcRect l="3925" b="131"/>
-          <a:stretch/>
+          <a:srcRect/>
+          <a:stretch>
+            <a:fillRect/>
+          </a:stretch>
         </p:blipFill>
         <p:spPr bwMode="auto">
           <a:xfrm>
-            <a:off x="2505075" y="3413956"/>
-            <a:ext cx="1244554" cy="827588"/>
+            <a:off x="1844824" y="4629948"/>
+            <a:ext cx="1657350" cy="904875"/>
           </a:xfrm>
           <a:prstGeom prst="rect">
             <a:avLst/>
@@ -14440,94 +14445,31 @@
           </a:extLst>
         </p:spPr>
       </p:pic>
-      <p:sp>
-        <p:nvSpPr>
-          <p:cNvPr id="14" name="Line Callout 1 (Border and Accent Bar) 13"/>
-          <p:cNvSpPr/>
-          <p:nvPr/>
-        </p:nvSpPr>
-        <p:spPr>
-          <a:xfrm rot="5400000">
-            <a:off x="1157769" y="3172731"/>
-            <a:ext cx="917852" cy="1310038"/>
-          </a:xfrm>
-          <a:prstGeom prst="accentBorderCallout1">
-            <a:avLst>
-              <a:gd name="adj1" fmla="val 48560"/>
-              <a:gd name="adj2" fmla="val -8333"/>
-              <a:gd name="adj3" fmla="val 67595"/>
-              <a:gd name="adj4" fmla="val -31900"/>
-            </a:avLst>
-          </a:prstGeom>
-        </p:spPr>
-        <p:style>
-          <a:lnRef idx="2">
-            <a:schemeClr val="accent1"/>
-          </a:lnRef>
-          <a:fillRef idx="1">
-            <a:schemeClr val="lt1"/>
-          </a:fillRef>
-          <a:effectRef idx="0">
-            <a:schemeClr val="accent1"/>
-          </a:effectRef>
-          <a:fontRef idx="minor">
-            <a:schemeClr val="dk1"/>
-          </a:fontRef>
-        </p:style>
-        <p:txBody>
-          <a:bodyPr rtlCol="0" anchor="ctr"/>
-          <a:lstStyle/>
-          <a:p>
-            <a:pPr algn="ctr"/>
-            <a:endParaRPr lang="en-US" dirty="0"/>
-          </a:p>
-        </p:txBody>
-      </p:sp>
-      <p:graphicFrame>
-        <p:nvGraphicFramePr>
-          <p:cNvPr id="2" name="Diagram 1"/>
-          <p:cNvGraphicFramePr/>
-          <p:nvPr>
-            <p:extLst>
-              <p:ext uri="{D42A27DB-BD31-4B8C-83A1-F6EECF244321}">
-                <p14:modId xmlns:p14="http://schemas.microsoft.com/office/powerpoint/2010/main" val="3351555147"/>
-              </p:ext>
-            </p:extLst>
-          </p:nvPr>
-        </p:nvGraphicFramePr>
-        <p:xfrm>
-          <a:off x="260648" y="272480"/>
-          <a:ext cx="6093296" cy="1751856"/>
-        </p:xfrm>
-        <a:graphic>
-          <a:graphicData uri="http://schemas.openxmlformats.org/drawingml/2006/diagram">
-            <dgm:relIds xmlns:dgm="http://schemas.openxmlformats.org/drawingml/2006/diagram" xmlns:r="http://schemas.openxmlformats.org/officeDocument/2006/relationships" r:dm="rId3" r:lo="rId4" r:qs="rId5" r:cs="rId6"/>
-          </a:graphicData>
-        </a:graphic>
-      </p:graphicFrame>
       <p:pic>
         <p:nvPicPr>
-          <p:cNvPr id="1026" name="Picture 2"/>
+          <p:cNvPr id="1027" name="Picture 3"/>
           <p:cNvPicPr>
             <a:picLocks noChangeAspect="1" noChangeArrowheads="1"/>
           </p:cNvPicPr>
           <p:nvPr/>
         </p:nvPicPr>
-        <p:blipFill rotWithShape="1">
-          <a:blip r:embed="rId8">
+        <p:blipFill>
+          <a:blip r:embed="rId2">
             <a:extLst>
               <a:ext uri="{28A0092B-C50C-407E-A947-70E740481C1C}">
                 <a14:useLocalDpi xmlns:a14="http://schemas.microsoft.com/office/drawing/2010/main" val="0"/>
               </a:ext>
             </a:extLst>
           </a:blip>
-          <a:srcRect l="22415" t="63423" r="31074" b="-5573"/>
-          <a:stretch/>
+          <a:srcRect/>
+          <a:stretch>
+            <a:fillRect/>
+          </a:stretch>
         </p:blipFill>
         <p:spPr bwMode="auto">
           <a:xfrm>
-            <a:off x="1052736" y="3613606"/>
-            <a:ext cx="1209452" cy="754794"/>
+            <a:off x="2403740" y="3405769"/>
+            <a:ext cx="1657350" cy="904875"/>
           </a:xfrm>
           <a:prstGeom prst="rect">
             <a:avLst/>
@@ -14567,6 +14509,180 @@
           </a:extLst>
         </p:spPr>
       </p:pic>
+      <p:pic>
+        <p:nvPicPr>
+          <p:cNvPr id="3" name="Picture 2"/>
+          <p:cNvPicPr>
+            <a:picLocks noChangeAspect="1" noChangeArrowheads="1"/>
+          </p:cNvPicPr>
+          <p:nvPr/>
+        </p:nvPicPr>
+        <p:blipFill>
+          <a:blip r:embed="rId3">
+            <a:extLst>
+              <a:ext uri="{28A0092B-C50C-407E-A947-70E740481C1C}">
+                <a14:useLocalDpi xmlns:a14="http://schemas.microsoft.com/office/drawing/2010/main" val="0"/>
+              </a:ext>
+            </a:extLst>
+          </a:blip>
+          <a:srcRect/>
+          <a:stretch>
+            <a:fillRect/>
+          </a:stretch>
+        </p:blipFill>
+        <p:spPr bwMode="auto">
+          <a:xfrm>
+            <a:off x="885825" y="3586745"/>
+            <a:ext cx="1619250" cy="723900"/>
+          </a:xfrm>
+          <a:prstGeom prst="rect">
+            <a:avLst/>
+          </a:prstGeom>
+          <a:noFill/>
+          <a:ln>
+            <a:noFill/>
+          </a:ln>
+          <a:effectLst/>
+          <a:extLst>
+            <a:ext uri="{909E8E84-426E-40DD-AFC4-6F175D3DCCD1}">
+              <a14:hiddenFill xmlns:a14="http://schemas.microsoft.com/office/drawing/2010/main">
+                <a:solidFill>
+                  <a:schemeClr val="accent1"/>
+                </a:solidFill>
+              </a14:hiddenFill>
+            </a:ext>
+            <a:ext uri="{91240B29-F687-4F45-9708-019B960494DF}">
+              <a14:hiddenLine xmlns:a14="http://schemas.microsoft.com/office/drawing/2010/main" w="9525">
+                <a:solidFill>
+                  <a:schemeClr val="tx1"/>
+                </a:solidFill>
+                <a:miter lim="800000"/>
+                <a:headEnd/>
+                <a:tailEnd/>
+              </a14:hiddenLine>
+            </a:ext>
+            <a:ext uri="{AF507438-7753-43E0-B8FC-AC1667EBCBE1}">
+              <a14:hiddenEffects xmlns:a14="http://schemas.microsoft.com/office/drawing/2010/main">
+                <a:effectLst>
+                  <a:outerShdw dist="35921" dir="2700000" algn="ctr" rotWithShape="0">
+                    <a:schemeClr val="bg2"/>
+                  </a:outerShdw>
+                </a:effectLst>
+              </a14:hiddenEffects>
+            </a:ext>
+          </a:extLst>
+        </p:spPr>
+      </p:pic>
+      <p:sp>
+        <p:nvSpPr>
+          <p:cNvPr id="19" name="Line Callout 1 (Border and Accent Bar) 18"/>
+          <p:cNvSpPr/>
+          <p:nvPr/>
+        </p:nvSpPr>
+        <p:spPr>
+          <a:xfrm rot="5400000">
+            <a:off x="2623647" y="3148918"/>
+            <a:ext cx="917852" cy="1357666"/>
+          </a:xfrm>
+          <a:prstGeom prst="accentBorderCallout1">
+            <a:avLst>
+              <a:gd name="adj1" fmla="val 48560"/>
+              <a:gd name="adj2" fmla="val -8333"/>
+              <a:gd name="adj3" fmla="val 62432"/>
+              <a:gd name="adj4" fmla="val -18825"/>
+            </a:avLst>
+          </a:prstGeom>
+          <a:noFill/>
+        </p:spPr>
+        <p:style>
+          <a:lnRef idx="2">
+            <a:schemeClr val="accent1"/>
+          </a:lnRef>
+          <a:fillRef idx="1">
+            <a:schemeClr val="lt1"/>
+          </a:fillRef>
+          <a:effectRef idx="0">
+            <a:schemeClr val="accent1"/>
+          </a:effectRef>
+          <a:fontRef idx="minor">
+            <a:schemeClr val="dk1"/>
+          </a:fontRef>
+        </p:style>
+        <p:txBody>
+          <a:bodyPr rtlCol="0" anchor="ctr"/>
+          <a:lstStyle/>
+          <a:p>
+            <a:pPr algn="ctr"/>
+            <a:endParaRPr lang="en-US" dirty="0"/>
+          </a:p>
+        </p:txBody>
+      </p:sp>
+      <p:sp>
+        <p:nvSpPr>
+          <p:cNvPr id="14" name="Line Callout 1 (Border and Accent Bar) 13"/>
+          <p:cNvSpPr/>
+          <p:nvPr/>
+        </p:nvSpPr>
+        <p:spPr>
+          <a:xfrm rot="5400000">
+            <a:off x="1119844" y="3134805"/>
+            <a:ext cx="917852" cy="1385889"/>
+          </a:xfrm>
+          <a:prstGeom prst="accentBorderCallout1">
+            <a:avLst>
+              <a:gd name="adj1" fmla="val 48560"/>
+              <a:gd name="adj2" fmla="val -8333"/>
+              <a:gd name="adj3" fmla="val 67595"/>
+              <a:gd name="adj4" fmla="val -31900"/>
+            </a:avLst>
+          </a:prstGeom>
+          <a:noFill/>
+        </p:spPr>
+        <p:style>
+          <a:lnRef idx="2">
+            <a:schemeClr val="accent1"/>
+          </a:lnRef>
+          <a:fillRef idx="1">
+            <a:schemeClr val="lt1"/>
+          </a:fillRef>
+          <a:effectRef idx="0">
+            <a:schemeClr val="accent1"/>
+          </a:effectRef>
+          <a:fontRef idx="minor">
+            <a:schemeClr val="dk1"/>
+          </a:fontRef>
+        </p:style>
+        <p:txBody>
+          <a:bodyPr rtlCol="0" anchor="ctr"/>
+          <a:lstStyle/>
+          <a:p>
+            <a:pPr algn="ctr"/>
+            <a:endParaRPr lang="en-US" dirty="0"/>
+          </a:p>
+        </p:txBody>
+      </p:sp>
+      <p:graphicFrame>
+        <p:nvGraphicFramePr>
+          <p:cNvPr id="2" name="Diagram 1"/>
+          <p:cNvGraphicFramePr/>
+          <p:nvPr>
+            <p:extLst>
+              <p:ext uri="{D42A27DB-BD31-4B8C-83A1-F6EECF244321}">
+                <p14:modId xmlns:p14="http://schemas.microsoft.com/office/powerpoint/2010/main" val="3351555147"/>
+              </p:ext>
+            </p:extLst>
+          </p:nvPr>
+        </p:nvGraphicFramePr>
+        <p:xfrm>
+          <a:off x="260648" y="272480"/>
+          <a:ext cx="6093296" cy="1751856"/>
+        </p:xfrm>
+        <a:graphic>
+          <a:graphicData uri="http://schemas.openxmlformats.org/drawingml/2006/diagram">
+            <dgm:relIds xmlns:dgm="http://schemas.openxmlformats.org/drawingml/2006/diagram" xmlns:r="http://schemas.openxmlformats.org/officeDocument/2006/relationships" r:dm="rId4" r:lo="rId5" r:qs="rId6" r:cs="rId7"/>
+          </a:graphicData>
+        </a:graphic>
+      </p:graphicFrame>
       <p:sp>
         <p:nvSpPr>
           <p:cNvPr id="9" name="Right Arrow 4"/>
@@ -14846,8 +14962,8 @@
         </p:nvSpPr>
         <p:spPr>
           <a:xfrm rot="16200000">
-            <a:off x="1978153" y="4396867"/>
-            <a:ext cx="917852" cy="1310038"/>
+            <a:off x="2048311" y="4326708"/>
+            <a:ext cx="917852" cy="1450355"/>
           </a:xfrm>
           <a:prstGeom prst="accentBorderCallout1">
             <a:avLst>
@@ -14857,6 +14973,7 @@
               <a:gd name="adj4" fmla="val -24117"/>
             </a:avLst>
           </a:prstGeom>
+          <a:noFill/>
         </p:spPr>
         <p:style>
           <a:lnRef idx="2">
@@ -14912,68 +15029,6 @@
           </a:p>
         </p:txBody>
       </p:sp>
-      <p:pic>
-        <p:nvPicPr>
-          <p:cNvPr id="26" name="Picture 4"/>
-          <p:cNvPicPr>
-            <a:picLocks noChangeAspect="1" noChangeArrowheads="1"/>
-          </p:cNvPicPr>
-          <p:nvPr/>
-        </p:nvPicPr>
-        <p:blipFill rotWithShape="1">
-          <a:blip r:embed="rId2">
-            <a:extLst>
-              <a:ext uri="{28A0092B-C50C-407E-A947-70E740481C1C}">
-                <a14:useLocalDpi xmlns:a14="http://schemas.microsoft.com/office/drawing/2010/main" val="0"/>
-              </a:ext>
-            </a:extLst>
-          </a:blip>
-          <a:srcRect l="3925" b="131"/>
-          <a:stretch/>
-        </p:blipFill>
-        <p:spPr bwMode="auto">
-          <a:xfrm>
-            <a:off x="1808525" y="4638092"/>
-            <a:ext cx="1244554" cy="827588"/>
-          </a:xfrm>
-          <a:prstGeom prst="rect">
-            <a:avLst/>
-          </a:prstGeom>
-          <a:noFill/>
-          <a:ln>
-            <a:noFill/>
-          </a:ln>
-          <a:effectLst/>
-          <a:extLst>
-            <a:ext uri="{909E8E84-426E-40DD-AFC4-6F175D3DCCD1}">
-              <a14:hiddenFill xmlns:a14="http://schemas.microsoft.com/office/drawing/2010/main">
-                <a:solidFill>
-                  <a:schemeClr val="accent1"/>
-                </a:solidFill>
-              </a14:hiddenFill>
-            </a:ext>
-            <a:ext uri="{91240B29-F687-4F45-9708-019B960494DF}">
-              <a14:hiddenLine xmlns:a14="http://schemas.microsoft.com/office/drawing/2010/main" w="9525">
-                <a:solidFill>
-                  <a:schemeClr val="tx1"/>
-                </a:solidFill>
-                <a:miter lim="800000"/>
-                <a:headEnd/>
-                <a:tailEnd/>
-              </a14:hiddenLine>
-            </a:ext>
-            <a:ext uri="{AF507438-7753-43E0-B8FC-AC1667EBCBE1}">
-              <a14:hiddenEffects xmlns:a14="http://schemas.microsoft.com/office/drawing/2010/main">
-                <a:effectLst>
-                  <a:outerShdw dist="35921" dir="2700000" algn="ctr" rotWithShape="0">
-                    <a:schemeClr val="bg2"/>
-                  </a:outerShdw>
-                </a:effectLst>
-              </a14:hiddenEffects>
-            </a:ext>
-          </a:extLst>
-        </p:spPr>
-      </p:pic>
       <p:sp>
         <p:nvSpPr>
           <p:cNvPr id="30" name="Left Brace 29"/>
@@ -14982,7 +15037,7 @@
         </p:nvSpPr>
         <p:spPr>
           <a:xfrm>
-            <a:off x="836712" y="3684424"/>
+            <a:off x="800706" y="3684424"/>
             <a:ext cx="72008" cy="557120"/>
           </a:xfrm>
           <a:prstGeom prst="leftBrace">
@@ -15063,12 +15118,12 @@
         </p:nvCxnSpPr>
         <p:spPr>
           <a:xfrm rot="10800000" flipH="1" flipV="1">
-            <a:off x="836711" y="3962984"/>
-            <a:ext cx="812403" cy="1052552"/>
+            <a:off x="800705" y="3962984"/>
+            <a:ext cx="848409" cy="1052552"/>
           </a:xfrm>
           <a:prstGeom prst="curvedConnector3">
             <a:avLst>
-              <a:gd name="adj1" fmla="val -28139"/>
+              <a:gd name="adj1" fmla="val -26945"/>
             </a:avLst>
           </a:prstGeom>
           <a:ln w="19050">
@@ -15098,8 +15153,8 @@
         </p:nvSpPr>
         <p:spPr>
           <a:xfrm>
-            <a:off x="2996952" y="4059758"/>
-            <a:ext cx="724101" cy="198755"/>
+            <a:off x="2852936" y="4059758"/>
+            <a:ext cx="871339" cy="198755"/>
           </a:xfrm>
           <a:prstGeom prst="rect">
             <a:avLst/>
@@ -15136,52 +15191,6 @@
           </a:p>
         </p:txBody>
       </p:sp>
-      <p:sp>
-        <p:nvSpPr>
-          <p:cNvPr id="52" name="Rectangle 51"/>
-          <p:cNvSpPr/>
-          <p:nvPr/>
-        </p:nvSpPr>
-        <p:spPr>
-          <a:xfrm>
-            <a:off x="2132856" y="5294096"/>
-            <a:ext cx="920223" cy="171584"/>
-          </a:xfrm>
-          <a:prstGeom prst="rect">
-            <a:avLst/>
-          </a:prstGeom>
-          <a:noFill/>
-          <a:ln>
-            <a:solidFill>
-              <a:schemeClr val="bg1"/>
-            </a:solidFill>
-          </a:ln>
-        </p:spPr>
-        <p:style>
-          <a:lnRef idx="2">
-            <a:schemeClr val="accent1">
-              <a:shade val="50000"/>
-            </a:schemeClr>
-          </a:lnRef>
-          <a:fillRef idx="1">
-            <a:schemeClr val="accent1"/>
-          </a:fillRef>
-          <a:effectRef idx="0">
-            <a:schemeClr val="accent1"/>
-          </a:effectRef>
-          <a:fontRef idx="minor">
-            <a:schemeClr val="lt1"/>
-          </a:fontRef>
-        </p:style>
-        <p:txBody>
-          <a:bodyPr rtlCol="0" anchor="ctr"/>
-          <a:lstStyle/>
-          <a:p>
-            <a:pPr algn="ctr"/>
-            <a:endParaRPr lang="en-US"/>
-          </a:p>
-        </p:txBody>
-      </p:sp>
       <p:cxnSp>
         <p:nvCxnSpPr>
           <p:cNvPr id="54" name="Curved Connector 53"/>
@@ -15193,12 +15202,12 @@
         </p:nvCxnSpPr>
         <p:spPr>
           <a:xfrm flipH="1">
-            <a:off x="3053079" y="4159136"/>
-            <a:ext cx="667974" cy="1220752"/>
+            <a:off x="3191937" y="4159136"/>
+            <a:ext cx="532338" cy="1264080"/>
           </a:xfrm>
           <a:prstGeom prst="curvedConnector3">
             <a:avLst>
-              <a:gd name="adj1" fmla="val -34223"/>
+              <a:gd name="adj1" fmla="val -42943"/>
             </a:avLst>
           </a:prstGeom>
           <a:ln w="19050">

</xml_diff>